<commit_message>
Refined lecture notes 04-01 & 04-02
</commit_message>
<xml_diff>
--- a/Fall 2017/Slides/03. Query Processing-1.pptx
+++ b/Fall 2017/Slides/03. Query Processing-1.pptx
@@ -4310,7 +4310,7 @@
               <a:pPr>
                 <a:defRPr/>
               </a:pPr>
-              <a:t>2017/10/10</a:t>
+              <a:t>2017/10/13</a:t>
             </a:fld>
             <a:endParaRPr lang="zh-CN" altLang="en-US"/>
           </a:p>
@@ -5174,7 +5174,7 @@
               <a:pPr>
                 <a:defRPr/>
               </a:pPr>
-              <a:t>2017/10/10</a:t>
+              <a:t>2017/10/13</a:t>
             </a:fld>
             <a:endParaRPr lang="zh-CN" altLang="en-US"/>
           </a:p>
@@ -5375,7 +5375,7 @@
               <a:pPr>
                 <a:defRPr/>
               </a:pPr>
-              <a:t>2017/10/10</a:t>
+              <a:t>2017/10/13</a:t>
             </a:fld>
             <a:endParaRPr lang="zh-CN" altLang="en-US"/>
           </a:p>
@@ -5585,7 +5585,7 @@
               <a:pPr>
                 <a:defRPr/>
               </a:pPr>
-              <a:t>2017/10/10</a:t>
+              <a:t>2017/10/13</a:t>
             </a:fld>
             <a:endParaRPr lang="zh-CN" altLang="en-US"/>
           </a:p>
@@ -5785,7 +5785,7 @@
               <a:pPr>
                 <a:defRPr/>
               </a:pPr>
-              <a:t>2017/10/10</a:t>
+              <a:t>2017/10/13</a:t>
             </a:fld>
             <a:endParaRPr lang="zh-CN" altLang="en-US"/>
           </a:p>
@@ -6308,7 +6308,7 @@
               <a:pPr>
                 <a:defRPr/>
               </a:pPr>
-              <a:t>2017/10/10</a:t>
+              <a:t>2017/10/13</a:t>
             </a:fld>
             <a:endParaRPr lang="zh-CN" altLang="en-US"/>
           </a:p>
@@ -6608,7 +6608,7 @@
               <a:pPr>
                 <a:defRPr/>
               </a:pPr>
-              <a:t>2017/10/10</a:t>
+              <a:t>2017/10/13</a:t>
             </a:fld>
             <a:endParaRPr lang="zh-CN" altLang="en-US"/>
           </a:p>
@@ -7123,7 +7123,7 @@
               <a:pPr>
                 <a:defRPr/>
               </a:pPr>
-              <a:t>2017/10/10</a:t>
+              <a:t>2017/10/13</a:t>
             </a:fld>
             <a:endParaRPr lang="zh-CN" altLang="en-US"/>
           </a:p>
@@ -7275,7 +7275,7 @@
               <a:pPr>
                 <a:defRPr/>
               </a:pPr>
-              <a:t>2017/10/10</a:t>
+              <a:t>2017/10/13</a:t>
             </a:fld>
             <a:endParaRPr lang="zh-CN" altLang="en-US"/>
           </a:p>
@@ -7520,7 +7520,7 @@
               <a:pPr>
                 <a:defRPr/>
               </a:pPr>
-              <a:t>2017/10/10</a:t>
+              <a:t>2017/10/13</a:t>
             </a:fld>
             <a:endParaRPr lang="zh-CN" altLang="en-US"/>
           </a:p>
@@ -7813,7 +7813,7 @@
               <a:pPr>
                 <a:defRPr/>
               </a:pPr>
-              <a:t>2017/10/10</a:t>
+              <a:t>2017/10/13</a:t>
             </a:fld>
             <a:endParaRPr lang="zh-CN" altLang="en-US"/>
           </a:p>
@@ -8280,7 +8280,7 @@
               <a:pPr>
                 <a:defRPr/>
               </a:pPr>
-              <a:t>2017/10/10</a:t>
+              <a:t>2017/10/13</a:t>
             </a:fld>
             <a:endParaRPr lang="zh-CN" altLang="en-US"/>
           </a:p>
@@ -8847,7 +8847,7 @@
               <a:pPr>
                 <a:defRPr/>
               </a:pPr>
-              <a:t>2017/10/10</a:t>
+              <a:t>2017/10/13</a:t>
             </a:fld>
             <a:endParaRPr lang="zh-CN" altLang="en-US"/>
           </a:p>
@@ -9566,10 +9566,16 @@
               <a:spcAft>
                 <a:spcPts val="0"/>
               </a:spcAft>
-              <a:buFont typeface="Wingdings 2"/>
-              <a:buNone/>
               <a:defRPr/>
             </a:pPr>
+            <a:r>
+              <a:rPr lang="en-US" altLang="zh-CN" sz="2800" dirty="0"/>
+              <a:t>Autumn, </a:t>
+            </a:r>
+            <a:r>
+              <a:rPr lang="en-US" altLang="zh-CN" sz="2800" dirty="0" smtClean="0"/>
+              <a:t>2017</a:t>
+            </a:r>
             <a:endParaRPr lang="zh-CN" altLang="en-US" sz="2800" dirty="0"/>
           </a:p>
         </p:txBody>
@@ -10671,7 +10677,7 @@
           <a:graphicData uri="http://schemas.openxmlformats.org/presentationml/2006/ole">
             <mc:AlternateContent xmlns:mc="http://schemas.openxmlformats.org/markup-compatibility/2006">
               <mc:Choice xmlns:v="urn:schemas-microsoft-com:vml" Requires="v">
-                <p:oleObj spid="_x0000_s4133" name="Equation" r:id="rId3" imgW="2133360" imgH="241200" progId="Equation.3">
+                <p:oleObj spid="_x0000_s4136" name="Equation" r:id="rId3" imgW="2133360" imgH="241200" progId="Equation.3">
                   <p:embed/>
                 </p:oleObj>
               </mc:Choice>
@@ -15080,17 +15086,7 @@
                   </a:schemeClr>
                 </a:solidFill>
               </a:rPr>
-              <a:t>Objectives </a:t>
-            </a:r>
-            <a:r>
-              <a:rPr lang="en-US" altLang="zh-CN" sz="4400" dirty="0" smtClean="0">
-                <a:solidFill>
-                  <a:schemeClr val="tx2">
-                    <a:satMod val="130000"/>
-                  </a:schemeClr>
-                </a:solidFill>
-              </a:rPr>
-              <a:t>of Query Processing</a:t>
+              <a:t>Objectives of Query Processing</a:t>
             </a:r>
             <a:endParaRPr lang="en-US" altLang="zh-CN" dirty="0" smtClean="0">
               <a:solidFill>
@@ -15695,17 +15691,7 @@
                   </a:schemeClr>
                 </a:solidFill>
               </a:rPr>
-              <a:t>Objectives </a:t>
-            </a:r>
-            <a:r>
-              <a:rPr lang="en-US" altLang="zh-CN" sz="4400" dirty="0" smtClean="0">
-                <a:solidFill>
-                  <a:schemeClr val="tx2">
-                    <a:satMod val="130000"/>
-                  </a:schemeClr>
-                </a:solidFill>
-              </a:rPr>
-              <a:t>of Query Processing</a:t>
+              <a:t>Objectives of Query Processing</a:t>
             </a:r>
             <a:endParaRPr lang="en-US" altLang="zh-CN" dirty="0" smtClean="0">
               <a:solidFill>
@@ -16533,17 +16519,7 @@
                   </a:schemeClr>
                 </a:solidFill>
               </a:rPr>
-              <a:t>Complexity </a:t>
-            </a:r>
-            <a:r>
-              <a:rPr lang="en-US" altLang="zh-CN" sz="2800" dirty="0" smtClean="0">
-                <a:solidFill>
-                  <a:schemeClr val="tx2">
-                    <a:satMod val="130000"/>
-                  </a:schemeClr>
-                </a:solidFill>
-              </a:rPr>
-              <a:t>of Relational Algebra Operations</a:t>
+              <a:t>Complexity of Relational Algebra Operations</a:t>
             </a:r>
             <a:endParaRPr lang="zh-CN" altLang="en-US" sz="2800" dirty="0">
               <a:solidFill>
@@ -16761,8 +16737,8 @@
           </a:p>
         </p:txBody>
       </p:sp>
-      <mc:AlternateContent xmlns:mc="http://schemas.openxmlformats.org/markup-compatibility/2006">
-        <mc:Choice xmlns:a14="http://schemas.microsoft.com/office/drawing/2010/main" Requires="a14">
+      <mc:AlternateContent xmlns:mc="http://schemas.openxmlformats.org/markup-compatibility/2006" xmlns:a14="http://schemas.microsoft.com/office/drawing/2010/main">
+        <mc:Choice Requires="a14">
           <p:graphicFrame>
             <p:nvGraphicFramePr>
               <p:cNvPr id="15" name="Table 14"/>
@@ -17261,7 +17237,7 @@
             </a:graphic>
           </p:graphicFrame>
         </mc:Choice>
-        <mc:Fallback>
+        <mc:Fallback xmlns="">
           <p:graphicFrame>
             <p:nvGraphicFramePr>
               <p:cNvPr id="15" name="Table 14"/>
@@ -17705,7 +17681,7 @@
           <a:graphicData uri="http://schemas.openxmlformats.org/presentationml/2006/ole">
             <mc:AlternateContent xmlns:mc="http://schemas.openxmlformats.org/markup-compatibility/2006">
               <mc:Choice xmlns:v="urn:schemas-microsoft-com:vml" Requires="v">
-                <p:oleObj spid="_x0000_s5233" name="Equation" r:id="rId4" imgW="863280" imgH="203040" progId="Equation.3">
+                <p:oleObj spid="_x0000_s5238" name="Equation" r:id="rId4" imgW="863280" imgH="203040" progId="Equation.3">
                   <p:embed/>
                 </p:oleObj>
               </mc:Choice>
@@ -17800,7 +17776,7 @@
           <a:graphicData uri="http://schemas.openxmlformats.org/presentationml/2006/ole">
             <mc:AlternateContent xmlns:mc="http://schemas.openxmlformats.org/markup-compatibility/2006">
               <mc:Choice xmlns:v="urn:schemas-microsoft-com:vml" Requires="v">
-                <p:oleObj spid="_x0000_s5234" name="Equation" r:id="rId6" imgW="114120" imgH="126720" progId="Equation.3">
+                <p:oleObj spid="_x0000_s5239" name="Equation" r:id="rId6" imgW="114120" imgH="126720" progId="Equation.3">
                   <p:embed/>
                 </p:oleObj>
               </mc:Choice>
@@ -17942,17 +17918,7 @@
                   </a:schemeClr>
                 </a:solidFill>
               </a:rPr>
-              <a:t>Types </a:t>
-            </a:r>
-            <a:r>
-              <a:rPr lang="en-US" altLang="zh-CN" dirty="0" smtClean="0">
-                <a:solidFill>
-                  <a:schemeClr val="tx2">
-                    <a:satMod val="130000"/>
-                  </a:schemeClr>
-                </a:solidFill>
-              </a:rPr>
-              <a:t>of Optimization</a:t>
+              <a:t>Types of Optimization</a:t>
             </a:r>
             <a:endParaRPr lang="zh-CN" altLang="en-US" dirty="0">
               <a:solidFill>
@@ -18385,7 +18351,7 @@
           <a:graphicData uri="http://schemas.openxmlformats.org/presentationml/2006/ole">
             <mc:AlternateContent xmlns:mc="http://schemas.openxmlformats.org/markup-compatibility/2006">
               <mc:Choice xmlns:v="urn:schemas-microsoft-com:vml" Requires="v">
-                <p:oleObj spid="_x0000_s6180" r:id="rId3" imgW="304800" imgH="152400" progId="Unknown">
+                <p:oleObj spid="_x0000_s6183" r:id="rId3" imgW="304800" imgH="152400" progId="Unknown">
                   <p:embed/>
                 </p:oleObj>
               </mc:Choice>
@@ -18500,17 +18466,7 @@
                   </a:schemeClr>
                 </a:solidFill>
               </a:rPr>
-              <a:t>Optimization </a:t>
-            </a:r>
-            <a:r>
-              <a:rPr lang="en-US" altLang="zh-CN" dirty="0" smtClean="0">
-                <a:solidFill>
-                  <a:schemeClr val="tx2">
-                    <a:satMod val="130000"/>
-                  </a:schemeClr>
-                </a:solidFill>
-              </a:rPr>
-              <a:t>Timing</a:t>
+              <a:t>Optimization Timing</a:t>
             </a:r>
             <a:endParaRPr lang="zh-CN" altLang="en-US" dirty="0">
               <a:solidFill>
@@ -19128,17 +19084,7 @@
                   </a:schemeClr>
                 </a:solidFill>
               </a:rPr>
-              <a:t>Decision </a:t>
-            </a:r>
-            <a:r>
-              <a:rPr lang="en-US" altLang="zh-CN" dirty="0" smtClean="0">
-                <a:solidFill>
-                  <a:schemeClr val="tx2">
-                    <a:satMod val="130000"/>
-                  </a:schemeClr>
-                </a:solidFill>
-              </a:rPr>
-              <a:t>Site</a:t>
+              <a:t>Decision Site</a:t>
             </a:r>
             <a:endParaRPr lang="zh-CN" altLang="en-US" dirty="0">
               <a:solidFill>
@@ -19988,7 +19934,7 @@
           <a:graphicData uri="http://schemas.openxmlformats.org/presentationml/2006/ole">
             <mc:AlternateContent xmlns:mc="http://schemas.openxmlformats.org/markup-compatibility/2006">
               <mc:Choice xmlns:v="urn:schemas-microsoft-com:vml" Requires="v">
-                <p:oleObj spid="_x0000_s1061" name="Equation" r:id="rId3" imgW="3492360" imgH="215640" progId="Equation.3">
+                <p:oleObj spid="_x0000_s1064" name="Equation" r:id="rId3" imgW="3492360" imgH="215640" progId="Equation.3">
                   <p:embed/>
                 </p:oleObj>
               </mc:Choice>
@@ -23169,7 +23115,7 @@
           <a:graphicData uri="http://schemas.openxmlformats.org/presentationml/2006/ole">
             <mc:AlternateContent xmlns:mc="http://schemas.openxmlformats.org/markup-compatibility/2006">
               <mc:Choice xmlns:v="urn:schemas-microsoft-com:vml" Requires="v">
-                <p:oleObj spid="_x0000_s3137" name="公式" r:id="rId3" imgW="2082600" imgH="241200" progId="Equation.3">
+                <p:oleObj spid="_x0000_s3142" name="公式" r:id="rId3" imgW="2082600" imgH="241200" progId="Equation.3">
                   <p:embed/>
                 </p:oleObj>
               </mc:Choice>
@@ -23264,7 +23210,7 @@
           <a:graphicData uri="http://schemas.openxmlformats.org/presentationml/2006/ole">
             <mc:AlternateContent xmlns:mc="http://schemas.openxmlformats.org/markup-compatibility/2006">
               <mc:Choice xmlns:v="urn:schemas-microsoft-com:vml" Requires="v">
-                <p:oleObj spid="_x0000_s3138" name="Equation" r:id="rId5" imgW="2425680" imgH="241200" progId="Equation.3">
+                <p:oleObj spid="_x0000_s3143" name="Equation" r:id="rId5" imgW="2425680" imgH="241200" progId="Equation.3">
                   <p:embed/>
                 </p:oleObj>
               </mc:Choice>

</xml_diff>